<commit_message>
Adding week 3 materials
First week 3 commit
</commit_message>
<xml_diff>
--- a/Week2/Week2Ppoint/The Internet.pptx
+++ b/Week2/Week2Ppoint/The Internet.pptx
@@ -5,7 +5,7 @@
     <p:sldMasterId id="2147483718" r:id="rId1"/>
   </p:sldMasterIdLst>
   <p:notesMasterIdLst>
-    <p:notesMasterId r:id="rId18"/>
+    <p:notesMasterId r:id="rId20"/>
   </p:notesMasterIdLst>
   <p:sldIdLst>
     <p:sldId id="256" r:id="rId2"/>
@@ -24,6 +24,8 @@
     <p:sldId id="269" r:id="rId15"/>
     <p:sldId id="270" r:id="rId16"/>
     <p:sldId id="271" r:id="rId17"/>
+    <p:sldId id="272" r:id="rId18"/>
+    <p:sldId id="273" r:id="rId19"/>
   </p:sldIdLst>
   <p:sldSz cx="12192000" cy="6858000"/>
   <p:notesSz cx="6858000" cy="9144000"/>
@@ -122,13 +124,18 @@
       </a:defRPr>
     </a:lvl9pPr>
   </p:defaultTextStyle>
+  <p:extLst>
+    <p:ext uri="{EFAFB233-063F-42B5-8137-9DF3F51BA10A}">
+      <p15:sldGuideLst xmlns:p15="http://schemas.microsoft.com/office/powerpoint/2012/main"/>
+    </p:ext>
+  </p:extLst>
 </p:presentation>
 </file>
 
 <file path=ppt/revisionInfo.xml><?xml version="1.0" encoding="utf-8"?>
 <p1510:revInfo xmlns:a="http://schemas.openxmlformats.org/drawingml/2006/main" xmlns:r="http://schemas.openxmlformats.org/officeDocument/2006/relationships" xmlns:p1510="http://schemas.microsoft.com/office/powerpoint/2015/10/main">
   <p1510:revLst>
-    <p1510:client id="{223FB79F-685E-4046-8153-A5012699D051}" v="59" dt="2019-11-05T22:04:23.064"/>
+    <p1510:client id="{223FB79F-685E-4046-8153-A5012699D051}" v="63" dt="2019-11-11T21:58:21.147"/>
   </p1510:revLst>
 </p1510:revInfo>
 </file>
@@ -138,7 +145,7 @@
   <pc:docChgLst>
     <pc:chgData name="Matt Duemler" userId="89a7c66d13ce5fcf" providerId="LiveId" clId="{223FB79F-685E-4046-8153-A5012699D051}"/>
     <pc:docChg chg="undo custSel mod addSld modSld">
-      <pc:chgData name="Matt Duemler" userId="89a7c66d13ce5fcf" providerId="LiveId" clId="{223FB79F-685E-4046-8153-A5012699D051}" dt="2019-11-05T22:05:31.478" v="2027" actId="20577"/>
+      <pc:chgData name="Matt Duemler" userId="89a7c66d13ce5fcf" providerId="LiveId" clId="{223FB79F-685E-4046-8153-A5012699D051}" dt="2019-11-11T22:00:33.582" v="2421" actId="20577"/>
       <pc:docMkLst>
         <pc:docMk/>
       </pc:docMkLst>
@@ -2141,6 +2148,180 @@
             <ac:cxnSpMk id="40" creationId="{B78EE79F-FCAA-4CF9-9746-730B51FC4CB3}"/>
           </ac:cxnSpMkLst>
         </pc:cxnChg>
+      </pc:sldChg>
+      <pc:sldChg chg="addSp delSp modSp add mod setBg">
+        <pc:chgData name="Matt Duemler" userId="89a7c66d13ce5fcf" providerId="LiveId" clId="{223FB79F-685E-4046-8153-A5012699D051}" dt="2019-11-11T21:56:36.658" v="2284" actId="26606"/>
+        <pc:sldMkLst>
+          <pc:docMk/>
+          <pc:sldMk cId="4254599860" sldId="272"/>
+        </pc:sldMkLst>
+        <pc:spChg chg="mod ord">
+          <ac:chgData name="Matt Duemler" userId="89a7c66d13ce5fcf" providerId="LiveId" clId="{223FB79F-685E-4046-8153-A5012699D051}" dt="2019-11-11T21:54:46.619" v="2046" actId="26606"/>
+          <ac:spMkLst>
+            <pc:docMk/>
+            <pc:sldMk cId="4254599860" sldId="272"/>
+            <ac:spMk id="2" creationId="{72C1D055-8F17-4471-BEF6-AAEB1A4059AA}"/>
+          </ac:spMkLst>
+        </pc:spChg>
+        <pc:spChg chg="del">
+          <ac:chgData name="Matt Duemler" userId="89a7c66d13ce5fcf" providerId="LiveId" clId="{223FB79F-685E-4046-8153-A5012699D051}" dt="2019-11-11T21:54:40.399" v="2043" actId="931"/>
+          <ac:spMkLst>
+            <pc:docMk/>
+            <pc:sldMk cId="4254599860" sldId="272"/>
+            <ac:spMk id="3" creationId="{40A8A5D6-FF8C-4EA2-A08E-E77590D94E16}"/>
+          </ac:spMkLst>
+        </pc:spChg>
+        <pc:spChg chg="add mod">
+          <ac:chgData name="Matt Duemler" userId="89a7c66d13ce5fcf" providerId="LiveId" clId="{223FB79F-685E-4046-8153-A5012699D051}" dt="2019-11-11T21:56:36.658" v="2284" actId="26606"/>
+          <ac:spMkLst>
+            <pc:docMk/>
+            <pc:sldMk cId="4254599860" sldId="272"/>
+            <ac:spMk id="9" creationId="{C50F8025-EB3E-4830-84F5-A87D71658163}"/>
+          </ac:spMkLst>
+        </pc:spChg>
+        <pc:spChg chg="add del">
+          <ac:chgData name="Matt Duemler" userId="89a7c66d13ce5fcf" providerId="LiveId" clId="{223FB79F-685E-4046-8153-A5012699D051}" dt="2019-11-11T21:56:36.658" v="2284" actId="26606"/>
+          <ac:spMkLst>
+            <pc:docMk/>
+            <pc:sldMk cId="4254599860" sldId="272"/>
+            <ac:spMk id="12" creationId="{282E2A95-1A08-4118-83C6-B1CA5648E075}"/>
+          </ac:spMkLst>
+        </pc:spChg>
+        <pc:spChg chg="add del">
+          <ac:chgData name="Matt Duemler" userId="89a7c66d13ce5fcf" providerId="LiveId" clId="{223FB79F-685E-4046-8153-A5012699D051}" dt="2019-11-11T21:56:36.658" v="2284" actId="26606"/>
+          <ac:spMkLst>
+            <pc:docMk/>
+            <pc:sldMk cId="4254599860" sldId="272"/>
+            <ac:spMk id="14" creationId="{68DC0EC7-60EA-4BD3-BC04-D547DE1B2891}"/>
+          </ac:spMkLst>
+        </pc:spChg>
+        <pc:spChg chg="add del">
+          <ac:chgData name="Matt Duemler" userId="89a7c66d13ce5fcf" providerId="LiveId" clId="{223FB79F-685E-4046-8153-A5012699D051}" dt="2019-11-11T21:56:36.658" v="2284" actId="26606"/>
+          <ac:spMkLst>
+            <pc:docMk/>
+            <pc:sldMk cId="4254599860" sldId="272"/>
+            <ac:spMk id="16" creationId="{2FFEFC7E-85EE-4AC9-A351-FBEB13A1D622}"/>
+          </ac:spMkLst>
+        </pc:spChg>
+        <pc:spChg chg="add del">
+          <ac:chgData name="Matt Duemler" userId="89a7c66d13ce5fcf" providerId="LiveId" clId="{223FB79F-685E-4046-8153-A5012699D051}" dt="2019-11-11T21:56:36.658" v="2284" actId="26606"/>
+          <ac:spMkLst>
+            <pc:docMk/>
+            <pc:sldMk cId="4254599860" sldId="272"/>
+            <ac:spMk id="18" creationId="{CB2511BB-FC4C-45F3-94EB-661D6806C942}"/>
+          </ac:spMkLst>
+        </pc:spChg>
+        <pc:spChg chg="add">
+          <ac:chgData name="Matt Duemler" userId="89a7c66d13ce5fcf" providerId="LiveId" clId="{223FB79F-685E-4046-8153-A5012699D051}" dt="2019-11-11T21:56:36.658" v="2284" actId="26606"/>
+          <ac:spMkLst>
+            <pc:docMk/>
+            <pc:sldMk cId="4254599860" sldId="272"/>
+            <ac:spMk id="23" creationId="{D5851415-CF4E-4C41-9E36-04E444B517EB}"/>
+          </ac:spMkLst>
+        </pc:spChg>
+        <pc:spChg chg="add">
+          <ac:chgData name="Matt Duemler" userId="89a7c66d13ce5fcf" providerId="LiveId" clId="{223FB79F-685E-4046-8153-A5012699D051}" dt="2019-11-11T21:56:36.658" v="2284" actId="26606"/>
+          <ac:spMkLst>
+            <pc:docMk/>
+            <pc:sldMk cId="4254599860" sldId="272"/>
+            <ac:spMk id="25" creationId="{4B516B89-DEA0-4832-8C56-F048168DAD88}"/>
+          </ac:spMkLst>
+        </pc:spChg>
+        <pc:spChg chg="add">
+          <ac:chgData name="Matt Duemler" userId="89a7c66d13ce5fcf" providerId="LiveId" clId="{223FB79F-685E-4046-8153-A5012699D051}" dt="2019-11-11T21:56:36.658" v="2284" actId="26606"/>
+          <ac:spMkLst>
+            <pc:docMk/>
+            <pc:sldMk cId="4254599860" sldId="272"/>
+            <ac:spMk id="27" creationId="{3EA2D33E-BAA2-467B-80B0-8887D9A99FBE}"/>
+          </ac:spMkLst>
+        </pc:spChg>
+        <pc:spChg chg="add">
+          <ac:chgData name="Matt Duemler" userId="89a7c66d13ce5fcf" providerId="LiveId" clId="{223FB79F-685E-4046-8153-A5012699D051}" dt="2019-11-11T21:56:36.658" v="2284" actId="26606"/>
+          <ac:spMkLst>
+            <pc:docMk/>
+            <pc:sldMk cId="4254599860" sldId="272"/>
+            <ac:spMk id="29" creationId="{6067C508-2065-42E3-98D2-F3A9B8339BA0}"/>
+          </ac:spMkLst>
+        </pc:spChg>
+        <pc:picChg chg="add mod">
+          <ac:chgData name="Matt Duemler" userId="89a7c66d13ce5fcf" providerId="LiveId" clId="{223FB79F-685E-4046-8153-A5012699D051}" dt="2019-11-11T21:56:36.658" v="2284" actId="26606"/>
+          <ac:picMkLst>
+            <pc:docMk/>
+            <pc:sldMk cId="4254599860" sldId="272"/>
+            <ac:picMk id="5" creationId="{854D3F9D-0510-4D41-92D4-71BC4273A142}"/>
+          </ac:picMkLst>
+        </pc:picChg>
+      </pc:sldChg>
+      <pc:sldChg chg="addSp delSp modSp add mod setBg">
+        <pc:chgData name="Matt Duemler" userId="89a7c66d13ce5fcf" providerId="LiveId" clId="{223FB79F-685E-4046-8153-A5012699D051}" dt="2019-11-11T22:00:33.582" v="2421" actId="20577"/>
+        <pc:sldMkLst>
+          <pc:docMk/>
+          <pc:sldMk cId="3408107011" sldId="273"/>
+        </pc:sldMkLst>
+        <pc:spChg chg="mod ord">
+          <ac:chgData name="Matt Duemler" userId="89a7c66d13ce5fcf" providerId="LiveId" clId="{223FB79F-685E-4046-8153-A5012699D051}" dt="2019-11-11T21:58:54.953" v="2321" actId="26606"/>
+          <ac:spMkLst>
+            <pc:docMk/>
+            <pc:sldMk cId="3408107011" sldId="273"/>
+            <ac:spMk id="2" creationId="{54371E71-C278-4374-828E-AF76B4A4F01F}"/>
+          </ac:spMkLst>
+        </pc:spChg>
+        <pc:spChg chg="del">
+          <ac:chgData name="Matt Duemler" userId="89a7c66d13ce5fcf" providerId="LiveId" clId="{223FB79F-685E-4046-8153-A5012699D051}" dt="2019-11-11T21:58:21.146" v="2286" actId="931"/>
+          <ac:spMkLst>
+            <pc:docMk/>
+            <pc:sldMk cId="3408107011" sldId="273"/>
+            <ac:spMk id="3" creationId="{81719C47-36AF-443C-8752-EB6F019816E6}"/>
+          </ac:spMkLst>
+        </pc:spChg>
+        <pc:spChg chg="add mod">
+          <ac:chgData name="Matt Duemler" userId="89a7c66d13ce5fcf" providerId="LiveId" clId="{223FB79F-685E-4046-8153-A5012699D051}" dt="2019-11-11T22:00:33.582" v="2421" actId="20577"/>
+          <ac:spMkLst>
+            <pc:docMk/>
+            <pc:sldMk cId="3408107011" sldId="273"/>
+            <ac:spMk id="9" creationId="{E029A7CB-5265-4348-9202-29A256914240}"/>
+          </ac:spMkLst>
+        </pc:spChg>
+        <pc:spChg chg="add">
+          <ac:chgData name="Matt Duemler" userId="89a7c66d13ce5fcf" providerId="LiveId" clId="{223FB79F-685E-4046-8153-A5012699D051}" dt="2019-11-11T21:58:54.953" v="2321" actId="26606"/>
+          <ac:spMkLst>
+            <pc:docMk/>
+            <pc:sldMk cId="3408107011" sldId="273"/>
+            <ac:spMk id="12" creationId="{282E2A95-1A08-4118-83C6-B1CA5648E075}"/>
+          </ac:spMkLst>
+        </pc:spChg>
+        <pc:spChg chg="add">
+          <ac:chgData name="Matt Duemler" userId="89a7c66d13ce5fcf" providerId="LiveId" clId="{223FB79F-685E-4046-8153-A5012699D051}" dt="2019-11-11T21:58:54.953" v="2321" actId="26606"/>
+          <ac:spMkLst>
+            <pc:docMk/>
+            <pc:sldMk cId="3408107011" sldId="273"/>
+            <ac:spMk id="14" creationId="{68DC0EC7-60EA-4BD3-BC04-D547DE1B2891}"/>
+          </ac:spMkLst>
+        </pc:spChg>
+        <pc:spChg chg="add">
+          <ac:chgData name="Matt Duemler" userId="89a7c66d13ce5fcf" providerId="LiveId" clId="{223FB79F-685E-4046-8153-A5012699D051}" dt="2019-11-11T21:58:54.953" v="2321" actId="26606"/>
+          <ac:spMkLst>
+            <pc:docMk/>
+            <pc:sldMk cId="3408107011" sldId="273"/>
+            <ac:spMk id="16" creationId="{2FFEFC7E-85EE-4AC9-A351-FBEB13A1D622}"/>
+          </ac:spMkLst>
+        </pc:spChg>
+        <pc:spChg chg="add">
+          <ac:chgData name="Matt Duemler" userId="89a7c66d13ce5fcf" providerId="LiveId" clId="{223FB79F-685E-4046-8153-A5012699D051}" dt="2019-11-11T21:58:54.953" v="2321" actId="26606"/>
+          <ac:spMkLst>
+            <pc:docMk/>
+            <pc:sldMk cId="3408107011" sldId="273"/>
+            <ac:spMk id="18" creationId="{CB2511BB-FC4C-45F3-94EB-661D6806C942}"/>
+          </ac:spMkLst>
+        </pc:spChg>
+        <pc:picChg chg="add mod">
+          <ac:chgData name="Matt Duemler" userId="89a7c66d13ce5fcf" providerId="LiveId" clId="{223FB79F-685E-4046-8153-A5012699D051}" dt="2019-11-11T21:58:54.953" v="2321" actId="26606"/>
+          <ac:picMkLst>
+            <pc:docMk/>
+            <pc:sldMk cId="3408107011" sldId="273"/>
+            <ac:picMk id="5" creationId="{CC4DD9C6-0358-48C8-BFD7-3BAD51AAA5CE}"/>
+          </ac:picMkLst>
+        </pc:picChg>
       </pc:sldChg>
     </pc:docChg>
   </pc:docChgLst>
@@ -2229,7 +2410,7 @@
           <a:p>
             <a:fld id="{0903BDFB-16B2-482C-9C25-22C155D43264}" type="datetimeFigureOut">
               <a:rPr lang="en-US" smtClean="0"/>
-              <a:t>11/5/2019</a:t>
+              <a:t>11/11/2019</a:t>
             </a:fld>
             <a:endParaRPr lang="en-US"/>
           </a:p>
@@ -3070,7 +3251,7 @@
           <a:p>
             <a:fld id="{EA0C0817-A112-4847-8014-A94B7D2A4EA3}" type="datetime1">
               <a:rPr lang="en-US" smtClean="0"/>
-              <a:t>11/4/2019</a:t>
+              <a:t>11/11/2019</a:t>
             </a:fld>
             <a:endParaRPr lang="en-US" dirty="0"/>
           </a:p>
@@ -3272,7 +3453,7 @@
           <a:p>
             <a:fld id="{134F40B7-36AB-4376-BE14-EF7004D79BB9}" type="datetime1">
               <a:rPr lang="en-US" smtClean="0"/>
-              <a:t>11/4/2019</a:t>
+              <a:t>11/11/2019</a:t>
             </a:fld>
             <a:endParaRPr lang="en-US"/>
           </a:p>
@@ -3452,7 +3633,7 @@
           <a:p>
             <a:fld id="{FF87CAB8-DCAE-46A5-AADA-B3FAD11A54E0}" type="datetime1">
               <a:rPr lang="en-US" smtClean="0"/>
-              <a:t>11/4/2019</a:t>
+              <a:t>11/11/2019</a:t>
             </a:fld>
             <a:endParaRPr lang="en-US"/>
           </a:p>
@@ -3622,7 +3803,7 @@
           <a:p>
             <a:fld id="{7332B432-ACDA-4023-A761-2BAB76577B62}" type="datetime1">
               <a:rPr lang="en-US" smtClean="0"/>
-              <a:t>11/4/2019</a:t>
+              <a:t>11/11/2019</a:t>
             </a:fld>
             <a:endParaRPr lang="en-US"/>
           </a:p>
@@ -4221,7 +4402,7 @@
           <a:p>
             <a:fld id="{D9C646AA-F36E-4540-911D-FFFC0A0EF24A}" type="datetime1">
               <a:rPr lang="en-US" smtClean="0"/>
-              <a:t>11/4/2019</a:t>
+              <a:t>11/11/2019</a:t>
             </a:fld>
             <a:endParaRPr lang="en-US" dirty="0"/>
           </a:p>
@@ -4541,7 +4722,7 @@
           <a:p>
             <a:fld id="{69186D26-FA5F-4637-B602-B7C2DC34CFD4}" type="datetime1">
               <a:rPr lang="en-US" smtClean="0"/>
-              <a:t>11/4/2019</a:t>
+              <a:t>11/11/2019</a:t>
             </a:fld>
             <a:endParaRPr lang="en-US"/>
           </a:p>
@@ -4976,7 +5157,7 @@
           <a:p>
             <a:fld id="{8A7F15D8-96D1-4781-BC50-CA8A088B2FE4}" type="datetime1">
               <a:rPr lang="en-US" smtClean="0"/>
-              <a:t>11/4/2019</a:t>
+              <a:t>11/11/2019</a:t>
             </a:fld>
             <a:endParaRPr lang="en-US"/>
           </a:p>
@@ -5094,7 +5275,7 @@
           <a:p>
             <a:fld id="{F9A96C99-B8F8-4528-BD05-0E16E943DC09}" type="datetime1">
               <a:rPr lang="en-US" smtClean="0"/>
-              <a:t>11/4/2019</a:t>
+              <a:t>11/11/2019</a:t>
             </a:fld>
             <a:endParaRPr lang="en-US"/>
           </a:p>
@@ -5189,7 +5370,7 @@
           <a:p>
             <a:fld id="{03636942-C211-4B28-8DBD-C953E00AF71B}" type="datetime1">
               <a:rPr lang="en-US" smtClean="0"/>
-              <a:t>11/4/2019</a:t>
+              <a:t>11/11/2019</a:t>
             </a:fld>
             <a:endParaRPr lang="en-US"/>
           </a:p>
@@ -5606,7 +5787,7 @@
           <a:p>
             <a:fld id="{7E8D12A6-918A-48BD-8CB9-CA713993B0EA}" type="datetime1">
               <a:rPr lang="en-US" smtClean="0"/>
-              <a:t>11/4/2019</a:t>
+              <a:t>11/11/2019</a:t>
             </a:fld>
             <a:endParaRPr lang="en-US"/>
           </a:p>
@@ -5868,7 +6049,7 @@
             <a:fld id="{E778CE86-875F-4587-BCF6-FA054AFC0D53}" type="datetime1">
               <a:rPr lang="en-US" smtClean="0"/>
               <a:pPr/>
-              <a:t>11/4/2019</a:t>
+              <a:t>11/11/2019</a:t>
             </a:fld>
             <a:endParaRPr lang="en-US" dirty="0"/>
           </a:p>
@@ -6384,7 +6565,7 @@
           <a:p>
             <a:fld id="{F6FA2B21-3FCD-4721-B95C-427943F61125}" type="datetime1">
               <a:rPr lang="en-US" smtClean="0"/>
-              <a:t>11/4/2019</a:t>
+              <a:t>11/11/2019</a:t>
             </a:fld>
             <a:endParaRPr lang="en-US"/>
           </a:p>
@@ -10447,6 +10628,836 @@
   </p:cSld>
   <p:clrMapOvr>
     <a:overrideClrMapping bg1="dk1" tx1="lt1" bg2="dk2" tx2="lt2" accent1="accent1" accent2="accent2" accent3="accent3" accent4="accent4" accent5="accent5" accent6="accent6" hlink="hlink" folHlink="folHlink"/>
+  </p:clrMapOvr>
+</p:sld>
+</file>
+
+<file path=ppt/slides/slide17.xml><?xml version="1.0" encoding="utf-8"?>
+<p:sld xmlns:a="http://schemas.openxmlformats.org/drawingml/2006/main" xmlns:r="http://schemas.openxmlformats.org/officeDocument/2006/relationships" xmlns:p="http://schemas.openxmlformats.org/presentationml/2006/main">
+  <p:cSld>
+    <p:bg>
+      <p:bgPr>
+        <a:solidFill>
+          <a:schemeClr val="bg1"/>
+        </a:solidFill>
+        <a:effectLst/>
+      </p:bgPr>
+    </p:bg>
+    <p:spTree>
+      <p:nvGrpSpPr>
+        <p:cNvPr id="1" name=""/>
+        <p:cNvGrpSpPr/>
+        <p:nvPr/>
+      </p:nvGrpSpPr>
+      <p:grpSpPr>
+        <a:xfrm>
+          <a:off x="0" y="0"/>
+          <a:ext cx="0" cy="0"/>
+          <a:chOff x="0" y="0"/>
+          <a:chExt cx="0" cy="0"/>
+        </a:xfrm>
+      </p:grpSpPr>
+      <p:sp useBgFill="1">
+        <p:nvSpPr>
+          <p:cNvPr id="23" name="Rectangle 22">
+            <a:extLst>
+              <a:ext uri="{FF2B5EF4-FFF2-40B4-BE49-F238E27FC236}">
+                <a16:creationId xmlns:a16="http://schemas.microsoft.com/office/drawing/2014/main" id="{D5851415-CF4E-4C41-9E36-04E444B517EB}"/>
+              </a:ext>
+              <a:ext uri="{C183D7F6-B498-43B3-948B-1728B52AA6E4}">
+                <adec:decorative xmlns:adec="http://schemas.microsoft.com/office/drawing/2017/decorative" val="1"/>
+              </a:ext>
+            </a:extLst>
+          </p:cNvPr>
+          <p:cNvSpPr>
+            <a:spLocks noGrp="1" noRot="1" noChangeAspect="1" noMove="1" noResize="1" noEditPoints="1" noAdjustHandles="1" noChangeArrowheads="1" noChangeShapeType="1" noTextEdit="1"/>
+          </p:cNvSpPr>
+          <p:nvPr>
+            <p:extLst>
+              <p:ext uri="{386F3935-93C4-4BCD-93E2-E3B085C9AB24}">
+                <p16:designElem xmlns:p16="http://schemas.microsoft.com/office/powerpoint/2015/main" val="1"/>
+              </p:ext>
+            </p:extLst>
+          </p:nvPr>
+        </p:nvSpPr>
+        <p:spPr>
+          <a:xfrm>
+            <a:off x="0" y="0"/>
+            <a:ext cx="12192000" cy="6858000"/>
+          </a:xfrm>
+          <a:prstGeom prst="rect">
+            <a:avLst/>
+          </a:prstGeom>
+          <a:ln>
+            <a:noFill/>
+          </a:ln>
+        </p:spPr>
+        <p:style>
+          <a:lnRef idx="2">
+            <a:schemeClr val="accent1">
+              <a:shade val="50000"/>
+            </a:schemeClr>
+          </a:lnRef>
+          <a:fillRef idx="1001">
+            <a:schemeClr val="lt1"/>
+          </a:fillRef>
+          <a:effectRef idx="0">
+            <a:schemeClr val="accent1"/>
+          </a:effectRef>
+          <a:fontRef idx="minor">
+            <a:schemeClr val="lt1"/>
+          </a:fontRef>
+        </p:style>
+        <p:txBody>
+          <a:bodyPr rtlCol="0" anchor="ctr"/>
+          <a:lstStyle/>
+          <a:p>
+            <a:pPr algn="ctr"/>
+            <a:endParaRPr lang="en-US"/>
+          </a:p>
+        </p:txBody>
+      </p:sp>
+      <p:sp>
+        <p:nvSpPr>
+          <p:cNvPr id="25" name="Rectangle 24">
+            <a:extLst>
+              <a:ext uri="{FF2B5EF4-FFF2-40B4-BE49-F238E27FC236}">
+                <a16:creationId xmlns:a16="http://schemas.microsoft.com/office/drawing/2014/main" id="{4B516B89-DEA0-4832-8C56-F048168DAD88}"/>
+              </a:ext>
+              <a:ext uri="{C183D7F6-B498-43B3-948B-1728B52AA6E4}">
+                <adec:decorative xmlns:adec="http://schemas.microsoft.com/office/drawing/2017/decorative" val="1"/>
+              </a:ext>
+            </a:extLst>
+          </p:cNvPr>
+          <p:cNvSpPr>
+            <a:spLocks noGrp="1" noRot="1" noChangeAspect="1" noMove="1" noResize="1" noEditPoints="1" noAdjustHandles="1" noChangeArrowheads="1" noChangeShapeType="1" noTextEdit="1"/>
+          </p:cNvSpPr>
+          <p:nvPr>
+            <p:extLst>
+              <p:ext uri="{386F3935-93C4-4BCD-93E2-E3B085C9AB24}">
+                <p16:designElem xmlns:p16="http://schemas.microsoft.com/office/powerpoint/2015/main" val="1"/>
+              </p:ext>
+            </p:extLst>
+          </p:nvPr>
+        </p:nvSpPr>
+        <p:spPr>
+          <a:xfrm>
+            <a:off x="417646" y="413053"/>
+            <a:ext cx="8212114" cy="6064596"/>
+          </a:xfrm>
+          <a:prstGeom prst="rect">
+            <a:avLst/>
+          </a:prstGeom>
+          <a:solidFill>
+            <a:srgbClr val="FFFFFF"/>
+          </a:solidFill>
+          <a:ln w="6350" cap="sq" cmpd="sng" algn="ctr">
+            <a:solidFill>
+              <a:schemeClr val="tx1">
+                <a:lumMod val="75000"/>
+                <a:lumOff val="25000"/>
+              </a:schemeClr>
+            </a:solidFill>
+            <a:prstDash val="solid"/>
+            <a:miter lim="800000"/>
+          </a:ln>
+          <a:effectLst/>
+        </p:spPr>
+      </p:sp>
+      <p:pic>
+        <p:nvPicPr>
+          <p:cNvPr id="5" name="Content Placeholder 4" descr="A screenshot of a cell phone&#10;&#10;Description automatically generated">
+            <a:extLst>
+              <a:ext uri="{FF2B5EF4-FFF2-40B4-BE49-F238E27FC236}">
+                <a16:creationId xmlns:a16="http://schemas.microsoft.com/office/drawing/2014/main" id="{854D3F9D-0510-4D41-92D4-71BC4273A142}"/>
+              </a:ext>
+            </a:extLst>
+          </p:cNvPr>
+          <p:cNvPicPr>
+            <a:picLocks noChangeAspect="1"/>
+          </p:cNvPicPr>
+          <p:nvPr/>
+        </p:nvPicPr>
+        <p:blipFill rotWithShape="1">
+          <a:blip r:embed="rId2">
+            <a:extLst>
+              <a:ext uri="{28A0092B-C50C-407E-A947-70E740481C1C}">
+                <a14:useLocalDpi xmlns:a14="http://schemas.microsoft.com/office/drawing/2010/main" val="0"/>
+              </a:ext>
+            </a:extLst>
+          </a:blip>
+          <a:srcRect r="25072" b="-2"/>
+          <a:stretch/>
+        </p:blipFill>
+        <p:spPr>
+          <a:xfrm>
+            <a:off x="582639" y="578707"/>
+            <a:ext cx="7882128" cy="5733288"/>
+          </a:xfrm>
+          <a:prstGeom prst="rect">
+            <a:avLst/>
+          </a:prstGeom>
+        </p:spPr>
+      </p:pic>
+      <p:sp>
+        <p:nvSpPr>
+          <p:cNvPr id="27" name="Rectangle 26">
+            <a:extLst>
+              <a:ext uri="{FF2B5EF4-FFF2-40B4-BE49-F238E27FC236}">
+                <a16:creationId xmlns:a16="http://schemas.microsoft.com/office/drawing/2014/main" id="{3EA2D33E-BAA2-467B-80B0-8887D9A99FBE}"/>
+              </a:ext>
+              <a:ext uri="{C183D7F6-B498-43B3-948B-1728B52AA6E4}">
+                <adec:decorative xmlns:adec="http://schemas.microsoft.com/office/drawing/2017/decorative" val="1"/>
+              </a:ext>
+            </a:extLst>
+          </p:cNvPr>
+          <p:cNvSpPr>
+            <a:spLocks noGrp="1" noRot="1" noChangeAspect="1" noMove="1" noResize="1" noEditPoints="1" noAdjustHandles="1" noChangeArrowheads="1" noChangeShapeType="1" noTextEdit="1"/>
+          </p:cNvSpPr>
+          <p:nvPr>
+            <p:extLst>
+              <p:ext uri="{386F3935-93C4-4BCD-93E2-E3B085C9AB24}">
+                <p16:designElem xmlns:p16="http://schemas.microsoft.com/office/powerpoint/2015/main" val="1"/>
+              </p:ext>
+            </p:extLst>
+          </p:nvPr>
+        </p:nvSpPr>
+        <p:spPr>
+          <a:xfrm>
+            <a:off x="9020386" y="237744"/>
+            <a:ext cx="2926080" cy="6382512"/>
+          </a:xfrm>
+          <a:prstGeom prst="rect">
+            <a:avLst/>
+          </a:prstGeom>
+          <a:solidFill>
+            <a:schemeClr val="bg1">
+              <a:lumMod val="85000"/>
+              <a:alpha val="60000"/>
+            </a:schemeClr>
+          </a:solidFill>
+          <a:ln>
+            <a:noFill/>
+          </a:ln>
+        </p:spPr>
+        <p:style>
+          <a:lnRef idx="2">
+            <a:schemeClr val="accent1">
+              <a:shade val="50000"/>
+            </a:schemeClr>
+          </a:lnRef>
+          <a:fillRef idx="1">
+            <a:schemeClr val="accent1"/>
+          </a:fillRef>
+          <a:effectRef idx="0">
+            <a:schemeClr val="accent1"/>
+          </a:effectRef>
+          <a:fontRef idx="minor">
+            <a:schemeClr val="lt1"/>
+          </a:fontRef>
+        </p:style>
+      </p:sp>
+      <p:sp>
+        <p:nvSpPr>
+          <p:cNvPr id="29" name="Rectangle 28">
+            <a:extLst>
+              <a:ext uri="{FF2B5EF4-FFF2-40B4-BE49-F238E27FC236}">
+                <a16:creationId xmlns:a16="http://schemas.microsoft.com/office/drawing/2014/main" id="{6067C508-2065-42E3-98D2-F3A9B8339BA0}"/>
+              </a:ext>
+              <a:ext uri="{C183D7F6-B498-43B3-948B-1728B52AA6E4}">
+                <adec:decorative xmlns:adec="http://schemas.microsoft.com/office/drawing/2017/decorative" val="1"/>
+              </a:ext>
+            </a:extLst>
+          </p:cNvPr>
+          <p:cNvSpPr>
+            <a:spLocks noGrp="1" noRot="1" noChangeAspect="1" noMove="1" noResize="1" noEditPoints="1" noAdjustHandles="1" noChangeArrowheads="1" noChangeShapeType="1" noTextEdit="1"/>
+          </p:cNvSpPr>
+          <p:nvPr>
+            <p:extLst>
+              <p:ext uri="{386F3935-93C4-4BCD-93E2-E3B085C9AB24}">
+                <p16:designElem xmlns:p16="http://schemas.microsoft.com/office/powerpoint/2015/main" val="1"/>
+              </p:ext>
+            </p:extLst>
+          </p:nvPr>
+        </p:nvSpPr>
+        <p:spPr>
+          <a:xfrm>
+            <a:off x="9184978" y="402336"/>
+            <a:ext cx="2596896" cy="6053328"/>
+          </a:xfrm>
+          <a:prstGeom prst="rect">
+            <a:avLst/>
+          </a:prstGeom>
+          <a:noFill/>
+          <a:ln w="6350">
+            <a:solidFill>
+              <a:schemeClr val="tx1">
+                <a:lumMod val="75000"/>
+                <a:lumOff val="25000"/>
+              </a:schemeClr>
+            </a:solidFill>
+          </a:ln>
+        </p:spPr>
+        <p:style>
+          <a:lnRef idx="2">
+            <a:schemeClr val="accent1">
+              <a:shade val="50000"/>
+            </a:schemeClr>
+          </a:lnRef>
+          <a:fillRef idx="1">
+            <a:schemeClr val="accent1"/>
+          </a:fillRef>
+          <a:effectRef idx="0">
+            <a:schemeClr val="accent1"/>
+          </a:effectRef>
+          <a:fontRef idx="minor">
+            <a:schemeClr val="lt1"/>
+          </a:fontRef>
+        </p:style>
+        <p:txBody>
+          <a:bodyPr rtlCol="0" anchor="ctr"/>
+          <a:lstStyle/>
+          <a:p>
+            <a:pPr algn="ctr"/>
+            <a:endParaRPr lang="en-US"/>
+          </a:p>
+        </p:txBody>
+      </p:sp>
+      <p:sp>
+        <p:nvSpPr>
+          <p:cNvPr id="2" name="Title 1">
+            <a:extLst>
+              <a:ext uri="{FF2B5EF4-FFF2-40B4-BE49-F238E27FC236}">
+                <a16:creationId xmlns:a16="http://schemas.microsoft.com/office/drawing/2014/main" id="{72C1D055-8F17-4471-BEF6-AAEB1A4059AA}"/>
+              </a:ext>
+            </a:extLst>
+          </p:cNvPr>
+          <p:cNvSpPr>
+            <a:spLocks noGrp="1"/>
+          </p:cNvSpPr>
+          <p:nvPr>
+            <p:ph type="title"/>
+          </p:nvPr>
+        </p:nvSpPr>
+        <p:spPr>
+          <a:xfrm>
+            <a:off x="9321801" y="612843"/>
+            <a:ext cx="2312480" cy="1499738"/>
+          </a:xfrm>
+        </p:spPr>
+        <p:txBody>
+          <a:bodyPr anchor="b">
+            <a:normAutofit/>
+          </a:bodyPr>
+          <a:lstStyle/>
+          <a:p>
+            <a:r>
+              <a:rPr lang="en-US" sz="2800"/>
+              <a:t>Evaluate Email</a:t>
+            </a:r>
+          </a:p>
+        </p:txBody>
+      </p:sp>
+      <p:sp>
+        <p:nvSpPr>
+          <p:cNvPr id="9" name="Content Placeholder 8">
+            <a:extLst>
+              <a:ext uri="{FF2B5EF4-FFF2-40B4-BE49-F238E27FC236}">
+                <a16:creationId xmlns:a16="http://schemas.microsoft.com/office/drawing/2014/main" id="{C50F8025-EB3E-4830-84F5-A87D71658163}"/>
+              </a:ext>
+            </a:extLst>
+          </p:cNvPr>
+          <p:cNvSpPr>
+            <a:spLocks noGrp="1"/>
+          </p:cNvSpPr>
+          <p:nvPr>
+            <p:ph idx="1"/>
+          </p:nvPr>
+        </p:nvSpPr>
+        <p:spPr>
+          <a:xfrm>
+            <a:off x="9321801" y="2149813"/>
+            <a:ext cx="2312479" cy="4046706"/>
+          </a:xfrm>
+        </p:spPr>
+        <p:txBody>
+          <a:bodyPr>
+            <a:normAutofit/>
+          </a:bodyPr>
+          <a:lstStyle/>
+          <a:p>
+            <a:r>
+              <a:rPr lang="en-US" dirty="0">
+                <a:solidFill>
+                  <a:schemeClr val="tx1">
+                    <a:lumMod val="85000"/>
+                    <a:lumOff val="15000"/>
+                  </a:schemeClr>
+                </a:solidFill>
+              </a:rPr>
+              <a:t>Phishing scams are used to gain information from simple information to sensitive passwords.</a:t>
+            </a:r>
+          </a:p>
+          <a:p>
+            <a:r>
+              <a:rPr lang="en-US" dirty="0">
+                <a:solidFill>
+                  <a:schemeClr val="tx1">
+                    <a:lumMod val="85000"/>
+                    <a:lumOff val="15000"/>
+                  </a:schemeClr>
+                </a:solidFill>
+              </a:rPr>
+              <a:t>Never open an attachment unless you trust the sender</a:t>
+            </a:r>
+          </a:p>
+          <a:p>
+            <a:r>
+              <a:rPr lang="en-US" dirty="0">
+                <a:solidFill>
+                  <a:schemeClr val="tx1">
+                    <a:lumMod val="85000"/>
+                    <a:lumOff val="15000"/>
+                  </a:schemeClr>
+                </a:solidFill>
+              </a:rPr>
+              <a:t>Never use a link inside an email you don’t trust.  Try not to if you can manage.</a:t>
+            </a:r>
+          </a:p>
+        </p:txBody>
+      </p:sp>
+    </p:spTree>
+    <p:extLst>
+      <p:ext uri="{BB962C8B-B14F-4D97-AF65-F5344CB8AC3E}">
+        <p14:creationId xmlns:p14="http://schemas.microsoft.com/office/powerpoint/2010/main" val="4254599860"/>
+      </p:ext>
+    </p:extLst>
+  </p:cSld>
+  <p:clrMapOvr>
+    <a:masterClrMapping/>
+  </p:clrMapOvr>
+</p:sld>
+</file>
+
+<file path=ppt/slides/slide18.xml><?xml version="1.0" encoding="utf-8"?>
+<p:sld xmlns:a="http://schemas.openxmlformats.org/drawingml/2006/main" xmlns:r="http://schemas.openxmlformats.org/officeDocument/2006/relationships" xmlns:p="http://schemas.openxmlformats.org/presentationml/2006/main">
+  <p:cSld>
+    <p:bg>
+      <p:bgPr>
+        <a:solidFill>
+          <a:schemeClr val="bg1"/>
+        </a:solidFill>
+        <a:effectLst/>
+      </p:bgPr>
+    </p:bg>
+    <p:spTree>
+      <p:nvGrpSpPr>
+        <p:cNvPr id="1" name=""/>
+        <p:cNvGrpSpPr/>
+        <p:nvPr/>
+      </p:nvGrpSpPr>
+      <p:grpSpPr>
+        <a:xfrm>
+          <a:off x="0" y="0"/>
+          <a:ext cx="0" cy="0"/>
+          <a:chOff x="0" y="0"/>
+          <a:chExt cx="0" cy="0"/>
+        </a:xfrm>
+      </p:grpSpPr>
+      <p:sp>
+        <p:nvSpPr>
+          <p:cNvPr id="12" name="Rectangle 11">
+            <a:extLst>
+              <a:ext uri="{FF2B5EF4-FFF2-40B4-BE49-F238E27FC236}">
+                <a16:creationId xmlns:a16="http://schemas.microsoft.com/office/drawing/2014/main" id="{282E2A95-1A08-4118-83C6-B1CA5648E075}"/>
+              </a:ext>
+              <a:ext uri="{C183D7F6-B498-43B3-948B-1728B52AA6E4}">
+                <adec:decorative xmlns:adec="http://schemas.microsoft.com/office/drawing/2017/decorative" val="1"/>
+              </a:ext>
+            </a:extLst>
+          </p:cNvPr>
+          <p:cNvSpPr>
+            <a:spLocks noGrp="1" noRot="1" noChangeAspect="1" noMove="1" noResize="1" noEditPoints="1" noAdjustHandles="1" noChangeArrowheads="1" noChangeShapeType="1" noTextEdit="1"/>
+          </p:cNvSpPr>
+          <p:nvPr>
+            <p:extLst>
+              <p:ext uri="{386F3935-93C4-4BCD-93E2-E3B085C9AB24}">
+                <p16:designElem xmlns:p16="http://schemas.microsoft.com/office/powerpoint/2015/main" val="1"/>
+              </p:ext>
+            </p:extLst>
+          </p:nvPr>
+        </p:nvSpPr>
+        <p:spPr>
+          <a:xfrm>
+            <a:off x="0" y="0"/>
+            <a:ext cx="12192000" cy="6858000"/>
+          </a:xfrm>
+          <a:prstGeom prst="rect">
+            <a:avLst/>
+          </a:prstGeom>
+          <a:ln>
+            <a:noFill/>
+          </a:ln>
+        </p:spPr>
+        <p:style>
+          <a:lnRef idx="2">
+            <a:schemeClr val="accent1">
+              <a:shade val="50000"/>
+            </a:schemeClr>
+          </a:lnRef>
+          <a:fillRef idx="1001">
+            <a:schemeClr val="lt1"/>
+          </a:fillRef>
+          <a:effectRef idx="0">
+            <a:schemeClr val="accent1"/>
+          </a:effectRef>
+          <a:fontRef idx="minor">
+            <a:schemeClr val="lt1"/>
+          </a:fontRef>
+        </p:style>
+        <p:txBody>
+          <a:bodyPr rtlCol="0" anchor="ctr"/>
+          <a:lstStyle/>
+          <a:p>
+            <a:pPr algn="ctr"/>
+            <a:endParaRPr lang="en-US"/>
+          </a:p>
+        </p:txBody>
+      </p:sp>
+      <p:sp>
+        <p:nvSpPr>
+          <p:cNvPr id="14" name="Rectangle 13">
+            <a:extLst>
+              <a:ext uri="{FF2B5EF4-FFF2-40B4-BE49-F238E27FC236}">
+                <a16:creationId xmlns:a16="http://schemas.microsoft.com/office/drawing/2014/main" id="{68DC0EC7-60EA-4BD3-BC04-D547DE1B2891}"/>
+              </a:ext>
+              <a:ext uri="{C183D7F6-B498-43B3-948B-1728B52AA6E4}">
+                <adec:decorative xmlns:adec="http://schemas.microsoft.com/office/drawing/2017/decorative" val="1"/>
+              </a:ext>
+            </a:extLst>
+          </p:cNvPr>
+          <p:cNvSpPr>
+            <a:spLocks noGrp="1" noRot="1" noChangeAspect="1" noMove="1" noResize="1" noEditPoints="1" noAdjustHandles="1" noChangeArrowheads="1" noChangeShapeType="1" noTextEdit="1"/>
+          </p:cNvSpPr>
+          <p:nvPr>
+            <p:extLst>
+              <p:ext uri="{386F3935-93C4-4BCD-93E2-E3B085C9AB24}">
+                <p16:designElem xmlns:p16="http://schemas.microsoft.com/office/powerpoint/2015/main" val="1"/>
+              </p:ext>
+            </p:extLst>
+          </p:nvPr>
+        </p:nvSpPr>
+        <p:spPr>
+          <a:xfrm>
+            <a:off x="410122" y="413053"/>
+            <a:ext cx="8212114" cy="6064596"/>
+          </a:xfrm>
+          <a:prstGeom prst="rect">
+            <a:avLst/>
+          </a:prstGeom>
+          <a:noFill/>
+          <a:ln w="6350" cap="sq" cmpd="sng" algn="ctr">
+            <a:solidFill>
+              <a:srgbClr val="404040"/>
+            </a:solidFill>
+            <a:prstDash val="solid"/>
+            <a:miter lim="800000"/>
+          </a:ln>
+          <a:effectLst/>
+        </p:spPr>
+      </p:sp>
+      <p:pic>
+        <p:nvPicPr>
+          <p:cNvPr id="5" name="Content Placeholder 4" descr="A screenshot of a cell phone&#10;&#10;Description automatically generated">
+            <a:extLst>
+              <a:ext uri="{FF2B5EF4-FFF2-40B4-BE49-F238E27FC236}">
+                <a16:creationId xmlns:a16="http://schemas.microsoft.com/office/drawing/2014/main" id="{CC4DD9C6-0358-48C8-BFD7-3BAD51AAA5CE}"/>
+              </a:ext>
+            </a:extLst>
+          </p:cNvPr>
+          <p:cNvPicPr>
+            <a:picLocks noChangeAspect="1"/>
+          </p:cNvPicPr>
+          <p:nvPr/>
+        </p:nvPicPr>
+        <p:blipFill>
+          <a:blip r:embed="rId2">
+            <a:extLst>
+              <a:ext uri="{28A0092B-C50C-407E-A947-70E740481C1C}">
+                <a14:useLocalDpi xmlns:a14="http://schemas.microsoft.com/office/drawing/2010/main" val="0"/>
+              </a:ext>
+            </a:extLst>
+          </a:blip>
+          <a:stretch>
+            <a:fillRect/>
+          </a:stretch>
+        </p:blipFill>
+        <p:spPr>
+          <a:xfrm>
+            <a:off x="1240555" y="882398"/>
+            <a:ext cx="6566169" cy="5121612"/>
+          </a:xfrm>
+          <a:prstGeom prst="rect">
+            <a:avLst/>
+          </a:prstGeom>
+        </p:spPr>
+      </p:pic>
+      <p:sp>
+        <p:nvSpPr>
+          <p:cNvPr id="16" name="Rectangle 15">
+            <a:extLst>
+              <a:ext uri="{FF2B5EF4-FFF2-40B4-BE49-F238E27FC236}">
+                <a16:creationId xmlns:a16="http://schemas.microsoft.com/office/drawing/2014/main" id="{2FFEFC7E-85EE-4AC9-A351-FBEB13A1D622}"/>
+              </a:ext>
+              <a:ext uri="{C183D7F6-B498-43B3-948B-1728B52AA6E4}">
+                <adec:decorative xmlns:adec="http://schemas.microsoft.com/office/drawing/2017/decorative" val="1"/>
+              </a:ext>
+            </a:extLst>
+          </p:cNvPr>
+          <p:cNvSpPr>
+            <a:spLocks noGrp="1" noRot="1" noChangeAspect="1" noMove="1" noResize="1" noEditPoints="1" noAdjustHandles="1" noChangeArrowheads="1" noChangeShapeType="1" noTextEdit="1"/>
+          </p:cNvSpPr>
+          <p:nvPr>
+            <p:extLst>
+              <p:ext uri="{386F3935-93C4-4BCD-93E2-E3B085C9AB24}">
+                <p16:designElem xmlns:p16="http://schemas.microsoft.com/office/powerpoint/2015/main" val="1"/>
+              </p:ext>
+            </p:extLst>
+          </p:nvPr>
+        </p:nvSpPr>
+        <p:spPr>
+          <a:xfrm>
+            <a:off x="9020386" y="237744"/>
+            <a:ext cx="2926080" cy="6382512"/>
+          </a:xfrm>
+          <a:prstGeom prst="rect">
+            <a:avLst/>
+          </a:prstGeom>
+          <a:solidFill>
+            <a:schemeClr val="bg1">
+              <a:lumMod val="75000"/>
+              <a:alpha val="60000"/>
+            </a:schemeClr>
+          </a:solidFill>
+          <a:ln>
+            <a:noFill/>
+          </a:ln>
+        </p:spPr>
+        <p:style>
+          <a:lnRef idx="2">
+            <a:schemeClr val="accent1">
+              <a:shade val="50000"/>
+            </a:schemeClr>
+          </a:lnRef>
+          <a:fillRef idx="1">
+            <a:schemeClr val="accent1"/>
+          </a:fillRef>
+          <a:effectRef idx="0">
+            <a:schemeClr val="accent1"/>
+          </a:effectRef>
+          <a:fontRef idx="minor">
+            <a:schemeClr val="lt1"/>
+          </a:fontRef>
+        </p:style>
+      </p:sp>
+      <p:sp>
+        <p:nvSpPr>
+          <p:cNvPr id="18" name="Rectangle 17">
+            <a:extLst>
+              <a:ext uri="{FF2B5EF4-FFF2-40B4-BE49-F238E27FC236}">
+                <a16:creationId xmlns:a16="http://schemas.microsoft.com/office/drawing/2014/main" id="{CB2511BB-FC4C-45F3-94EB-661D6806C942}"/>
+              </a:ext>
+              <a:ext uri="{C183D7F6-B498-43B3-948B-1728B52AA6E4}">
+                <adec:decorative xmlns:adec="http://schemas.microsoft.com/office/drawing/2017/decorative" val="1"/>
+              </a:ext>
+            </a:extLst>
+          </p:cNvPr>
+          <p:cNvSpPr>
+            <a:spLocks noGrp="1" noRot="1" noChangeAspect="1" noMove="1" noResize="1" noEditPoints="1" noAdjustHandles="1" noChangeArrowheads="1" noChangeShapeType="1" noTextEdit="1"/>
+          </p:cNvSpPr>
+          <p:nvPr>
+            <p:extLst>
+              <p:ext uri="{386F3935-93C4-4BCD-93E2-E3B085C9AB24}">
+                <p16:designElem xmlns:p16="http://schemas.microsoft.com/office/powerpoint/2015/main" val="1"/>
+              </p:ext>
+            </p:extLst>
+          </p:nvPr>
+        </p:nvSpPr>
+        <p:spPr>
+          <a:xfrm>
+            <a:off x="9156699" y="413053"/>
+            <a:ext cx="2616201" cy="6064596"/>
+          </a:xfrm>
+          <a:prstGeom prst="rect">
+            <a:avLst/>
+          </a:prstGeom>
+          <a:noFill/>
+          <a:ln w="6350">
+            <a:solidFill>
+              <a:schemeClr val="tx1">
+                <a:lumMod val="75000"/>
+                <a:lumOff val="25000"/>
+              </a:schemeClr>
+            </a:solidFill>
+          </a:ln>
+        </p:spPr>
+        <p:style>
+          <a:lnRef idx="2">
+            <a:schemeClr val="accent1">
+              <a:shade val="50000"/>
+            </a:schemeClr>
+          </a:lnRef>
+          <a:fillRef idx="1">
+            <a:schemeClr val="accent1"/>
+          </a:fillRef>
+          <a:effectRef idx="0">
+            <a:schemeClr val="accent1"/>
+          </a:effectRef>
+          <a:fontRef idx="minor">
+            <a:schemeClr val="lt1"/>
+          </a:fontRef>
+        </p:style>
+        <p:txBody>
+          <a:bodyPr rtlCol="0" anchor="ctr"/>
+          <a:lstStyle/>
+          <a:p>
+            <a:pPr algn="ctr"/>
+            <a:endParaRPr lang="en-US"/>
+          </a:p>
+        </p:txBody>
+      </p:sp>
+      <p:sp>
+        <p:nvSpPr>
+          <p:cNvPr id="2" name="Title 1">
+            <a:extLst>
+              <a:ext uri="{FF2B5EF4-FFF2-40B4-BE49-F238E27FC236}">
+                <a16:creationId xmlns:a16="http://schemas.microsoft.com/office/drawing/2014/main" id="{54371E71-C278-4374-828E-AF76B4A4F01F}"/>
+              </a:ext>
+            </a:extLst>
+          </p:cNvPr>
+          <p:cNvSpPr>
+            <a:spLocks noGrp="1"/>
+          </p:cNvSpPr>
+          <p:nvPr>
+            <p:ph type="title"/>
+          </p:nvPr>
+        </p:nvSpPr>
+        <p:spPr>
+          <a:xfrm>
+            <a:off x="9321801" y="612843"/>
+            <a:ext cx="2312480" cy="1499738"/>
+          </a:xfrm>
+        </p:spPr>
+        <p:txBody>
+          <a:bodyPr anchor="b">
+            <a:normAutofit/>
+          </a:bodyPr>
+          <a:lstStyle/>
+          <a:p>
+            <a:r>
+              <a:rPr lang="en-US" sz="2800"/>
+              <a:t>Don’t let logo’s throw you off</a:t>
+            </a:r>
+          </a:p>
+        </p:txBody>
+      </p:sp>
+      <p:sp>
+        <p:nvSpPr>
+          <p:cNvPr id="9" name="Content Placeholder 8">
+            <a:extLst>
+              <a:ext uri="{FF2B5EF4-FFF2-40B4-BE49-F238E27FC236}">
+                <a16:creationId xmlns:a16="http://schemas.microsoft.com/office/drawing/2014/main" id="{E029A7CB-5265-4348-9202-29A256914240}"/>
+              </a:ext>
+            </a:extLst>
+          </p:cNvPr>
+          <p:cNvSpPr>
+            <a:spLocks noGrp="1"/>
+          </p:cNvSpPr>
+          <p:nvPr>
+            <p:ph idx="1"/>
+          </p:nvPr>
+        </p:nvSpPr>
+        <p:spPr>
+          <a:xfrm>
+            <a:off x="9321801" y="2149813"/>
+            <a:ext cx="2312479" cy="3854197"/>
+          </a:xfrm>
+        </p:spPr>
+        <p:txBody>
+          <a:bodyPr>
+            <a:normAutofit/>
+          </a:bodyPr>
+          <a:lstStyle/>
+          <a:p>
+            <a:pPr marL="342900" indent="-342900">
+              <a:buFont typeface="+mj-lt"/>
+              <a:buAutoNum type="arabicPeriod"/>
+            </a:pPr>
+            <a:r>
+              <a:rPr lang="en-US" dirty="0">
+                <a:solidFill>
+                  <a:schemeClr val="tx1">
+                    <a:lumMod val="85000"/>
+                    <a:lumOff val="15000"/>
+                  </a:schemeClr>
+                </a:solidFill>
+              </a:rPr>
+              <a:t>Wrong email domain</a:t>
+            </a:r>
+          </a:p>
+          <a:p>
+            <a:pPr marL="342900" indent="-342900">
+              <a:buFont typeface="+mj-lt"/>
+              <a:buAutoNum type="arabicPeriod"/>
+            </a:pPr>
+            <a:r>
+              <a:rPr lang="en-US" dirty="0">
+                <a:solidFill>
+                  <a:schemeClr val="tx1">
+                    <a:lumMod val="85000"/>
+                    <a:lumOff val="15000"/>
+                  </a:schemeClr>
+                </a:solidFill>
+              </a:rPr>
+              <a:t>Scare tactics’	</a:t>
+            </a:r>
+          </a:p>
+          <a:p>
+            <a:pPr marL="342900" indent="-342900">
+              <a:buFont typeface="+mj-lt"/>
+              <a:buAutoNum type="arabicPeriod"/>
+            </a:pPr>
+            <a:r>
+              <a:rPr lang="en-US">
+                <a:solidFill>
+                  <a:schemeClr val="tx1">
+                    <a:lumMod val="85000"/>
+                    <a:lumOff val="15000"/>
+                  </a:schemeClr>
+                </a:solidFill>
+              </a:rPr>
+              <a:t>Fake Link!</a:t>
+            </a:r>
+            <a:endParaRPr lang="en-US" dirty="0">
+              <a:solidFill>
+                <a:schemeClr val="tx1">
+                  <a:lumMod val="85000"/>
+                  <a:lumOff val="15000"/>
+                </a:schemeClr>
+              </a:solidFill>
+            </a:endParaRPr>
+          </a:p>
+        </p:txBody>
+      </p:sp>
+    </p:spTree>
+    <p:extLst>
+      <p:ext uri="{BB962C8B-B14F-4D97-AF65-F5344CB8AC3E}">
+        <p14:creationId xmlns:p14="http://schemas.microsoft.com/office/powerpoint/2010/main" val="3408107011"/>
+      </p:ext>
+    </p:extLst>
+  </p:cSld>
+  <p:clrMapOvr>
+    <a:masterClrMapping/>
   </p:clrMapOvr>
 </p:sld>
 </file>

</xml_diff>